<commit_message>
remove above and maxposition, add clouds (without api for the moment)
</commit_message>
<xml_diff>
--- a/Docs/MOBPRO_APP_Abschluss.pptx
+++ b/Docs/MOBPRO_APP_Abschluss.pptx
@@ -8,8 +8,9 @@
     <p:sldId id="256" r:id="rId2"/>
     <p:sldId id="260" r:id="rId3"/>
     <p:sldId id="257" r:id="rId4"/>
-    <p:sldId id="258" r:id="rId5"/>
-    <p:sldId id="259" r:id="rId6"/>
+    <p:sldId id="261" r:id="rId5"/>
+    <p:sldId id="258" r:id="rId6"/>
+    <p:sldId id="259" r:id="rId7"/>
   </p:sldIdLst>
   <p:sldSz cx="12192000" cy="6858000"/>
   <p:notesSz cx="6858000" cy="9144000"/>
@@ -3532,6 +3533,12 @@
           <a:p>
             <a:endParaRPr lang="de-CH" dirty="0"/>
           </a:p>
+          <a:p>
+            <a:r>
+              <a:rPr lang="de-CH" dirty="0"/>
+              <a:t>Richtet sich an Personen die von der Sonne profitieren möchten…</a:t>
+            </a:r>
+          </a:p>
         </p:txBody>
       </p:sp>
     </p:spTree>
@@ -3592,34 +3599,36 @@
           </a:p>
         </p:txBody>
       </p:sp>
-      <p:sp>
-        <p:nvSpPr>
-          <p:cNvPr id="3" name="Inhaltsplatzhalter 2">
-            <a:extLst>
-              <a:ext uri="{FF2B5EF4-FFF2-40B4-BE49-F238E27FC236}">
-                <a16:creationId xmlns:a16="http://schemas.microsoft.com/office/drawing/2014/main" id="{57E3092F-C426-4868-AA4C-7D174E28AB61}"/>
-              </a:ext>
-            </a:extLst>
-          </p:cNvPr>
-          <p:cNvSpPr>
-            <a:spLocks noGrp="1"/>
-          </p:cNvSpPr>
-          <p:nvPr>
-            <p:ph idx="1"/>
-          </p:nvPr>
-        </p:nvSpPr>
-        <p:spPr/>
-        <p:txBody>
-          <a:bodyPr/>
-          <a:lstStyle/>
-          <a:p>
-            <a:pPr marL="0" indent="0">
-              <a:buNone/>
-            </a:pPr>
-            <a:endParaRPr lang="de-CH" dirty="0"/>
-          </a:p>
-        </p:txBody>
-      </p:sp>
+      <p:pic>
+        <p:nvPicPr>
+          <p:cNvPr id="4" name="Grafik 3">
+            <a:extLst>
+              <a:ext uri="{FF2B5EF4-FFF2-40B4-BE49-F238E27FC236}">
+                <a16:creationId xmlns:a16="http://schemas.microsoft.com/office/drawing/2014/main" id="{38FC6066-473F-45EF-9C16-10E959671F7F}"/>
+              </a:ext>
+            </a:extLst>
+          </p:cNvPr>
+          <p:cNvPicPr>
+            <a:picLocks noChangeAspect="1"/>
+          </p:cNvPicPr>
+          <p:nvPr/>
+        </p:nvPicPr>
+        <p:blipFill>
+          <a:blip r:embed="rId2"/>
+          <a:stretch>
+            <a:fillRect/>
+          </a:stretch>
+        </p:blipFill>
+        <p:spPr>
+          <a:xfrm>
+            <a:off x="5438567" y="543960"/>
+            <a:ext cx="3362325" cy="5591175"/>
+          </a:xfrm>
+          <a:prstGeom prst="rect">
+            <a:avLst/>
+          </a:prstGeom>
+        </p:spPr>
+      </p:pic>
     </p:spTree>
     <p:extLst>
       <p:ext uri="{BB962C8B-B14F-4D97-AF65-F5344CB8AC3E}">
@@ -3655,6 +3664,140 @@
           <p:cNvPr id="2" name="Titel 1">
             <a:extLst>
               <a:ext uri="{FF2B5EF4-FFF2-40B4-BE49-F238E27FC236}">
+                <a16:creationId xmlns:a16="http://schemas.microsoft.com/office/drawing/2014/main" id="{CD3E5F9B-A938-4AC1-ADC2-0908A0DBA0E1}"/>
+              </a:ext>
+            </a:extLst>
+          </p:cNvPr>
+          <p:cNvSpPr>
+            <a:spLocks noGrp="1"/>
+          </p:cNvSpPr>
+          <p:nvPr>
+            <p:ph type="title"/>
+          </p:nvPr>
+        </p:nvSpPr>
+        <p:spPr/>
+        <p:txBody>
+          <a:bodyPr/>
+          <a:lstStyle/>
+          <a:p>
+            <a:r>
+              <a:rPr lang="de-CH" dirty="0"/>
+              <a:t>Technische Lösungen</a:t>
+            </a:r>
+          </a:p>
+        </p:txBody>
+      </p:sp>
+      <p:sp>
+        <p:nvSpPr>
+          <p:cNvPr id="3" name="Inhaltsplatzhalter 2">
+            <a:extLst>
+              <a:ext uri="{FF2B5EF4-FFF2-40B4-BE49-F238E27FC236}">
+                <a16:creationId xmlns:a16="http://schemas.microsoft.com/office/drawing/2014/main" id="{395EBC8F-3688-4BA1-8DAC-60BDCB6090B8}"/>
+              </a:ext>
+            </a:extLst>
+          </p:cNvPr>
+          <p:cNvSpPr>
+            <a:spLocks noGrp="1"/>
+          </p:cNvSpPr>
+          <p:nvPr>
+            <p:ph idx="1"/>
+          </p:nvPr>
+        </p:nvSpPr>
+        <p:spPr/>
+        <p:txBody>
+          <a:bodyPr/>
+          <a:lstStyle/>
+          <a:p>
+            <a:r>
+              <a:rPr lang="de-CH" dirty="0"/>
+              <a:t>Nr. 1: API für Daten anfragen (HTTP)</a:t>
+            </a:r>
+          </a:p>
+          <a:p>
+            <a:r>
+              <a:rPr lang="de-CH" dirty="0"/>
+              <a:t>Nr. 2: Service der die Daten der API resp. Persistenz zur Verfügung stellt</a:t>
+            </a:r>
+          </a:p>
+          <a:p>
+            <a:r>
+              <a:rPr lang="de-CH" dirty="0"/>
+              <a:t>Nr. 3: Lokale Persistenz der abgefragten Daten</a:t>
+            </a:r>
+          </a:p>
+          <a:p>
+            <a:r>
+              <a:rPr lang="de-CH" dirty="0"/>
+              <a:t>Nr. 5: Standort abfragen (</a:t>
+            </a:r>
+            <a:r>
+              <a:rPr lang="de-CH" dirty="0" err="1"/>
+              <a:t>LocationManager</a:t>
+            </a:r>
+            <a:r>
+              <a:rPr lang="de-CH" dirty="0"/>
+              <a:t>), nicht behandelter Stoff</a:t>
+            </a:r>
+          </a:p>
+          <a:p>
+            <a:r>
+              <a:rPr lang="de-CH" dirty="0"/>
+              <a:t>Nr. </a:t>
+            </a:r>
+            <a:r>
+              <a:rPr lang="de-CH"/>
+              <a:t>7</a:t>
+            </a:r>
+            <a:r>
+              <a:rPr lang="de-CH" dirty="0"/>
+              <a:t>:</a:t>
+            </a:r>
+            <a:r>
+              <a:rPr lang="de-CH"/>
+              <a:t> </a:t>
+            </a:r>
+            <a:r>
+              <a:rPr lang="de-CH" dirty="0"/>
+              <a:t>Nebenläufige API-Calls</a:t>
+            </a:r>
+          </a:p>
+        </p:txBody>
+      </p:sp>
+    </p:spTree>
+    <p:extLst>
+      <p:ext uri="{BB962C8B-B14F-4D97-AF65-F5344CB8AC3E}">
+        <p14:creationId xmlns:p14="http://schemas.microsoft.com/office/powerpoint/2010/main" val="2509862775"/>
+      </p:ext>
+    </p:extLst>
+  </p:cSld>
+  <p:clrMapOvr>
+    <a:masterClrMapping/>
+  </p:clrMapOvr>
+</p:sld>
+</file>
+
+<file path=ppt/slides/slide5.xml><?xml version="1.0" encoding="utf-8"?>
+<p:sld xmlns:a="http://schemas.openxmlformats.org/drawingml/2006/main" xmlns:r="http://schemas.openxmlformats.org/officeDocument/2006/relationships" xmlns:p="http://schemas.openxmlformats.org/presentationml/2006/main">
+  <p:cSld>
+    <p:spTree>
+      <p:nvGrpSpPr>
+        <p:cNvPr id="1" name=""/>
+        <p:cNvGrpSpPr/>
+        <p:nvPr/>
+      </p:nvGrpSpPr>
+      <p:grpSpPr>
+        <a:xfrm>
+          <a:off x="0" y="0"/>
+          <a:ext cx="0" cy="0"/>
+          <a:chOff x="0" y="0"/>
+          <a:chExt cx="0" cy="0"/>
+        </a:xfrm>
+      </p:grpSpPr>
+      <p:sp>
+        <p:nvSpPr>
+          <p:cNvPr id="2" name="Titel 1">
+            <a:extLst>
+              <a:ext uri="{FF2B5EF4-FFF2-40B4-BE49-F238E27FC236}">
                 <a16:creationId xmlns:a16="http://schemas.microsoft.com/office/drawing/2014/main" id="{A913938A-CABF-4915-8B2B-8BCE1AA238EF}"/>
               </a:ext>
             </a:extLst>
@@ -3796,7 +3939,7 @@
 </p:sld>
 </file>
 
-<file path=ppt/slides/slide5.xml><?xml version="1.0" encoding="utf-8"?>
+<file path=ppt/slides/slide6.xml><?xml version="1.0" encoding="utf-8"?>
 <p:sld xmlns:a="http://schemas.openxmlformats.org/drawingml/2006/main" xmlns:r="http://schemas.openxmlformats.org/officeDocument/2006/relationships" xmlns:p="http://schemas.openxmlformats.org/presentationml/2006/main">
   <p:cSld>
     <p:spTree>

</xml_diff>